<commit_message>
Add legacy character and monster sprite assets
Added a large collection of legacy character and monster sprite assets, including Aseprite files, PNGs, GIF previews, and import metadata. This update includes assets for various characters (Frog, Mummy, Ogre, Slime, Wizard, Mechanic, Bridge Heroine, Dancing Girl) and monster packs, organized by type and animation. These resources will support game development and animation workflows.
</commit_message>
<xml_diff>
--- a/final-project/CS315 P3 Production.pptx
+++ b/final-project/CS315 P3 Production.pptx
@@ -261,7 +261,7 @@
           <a:p>
             <a:fld id="{052CEAA0-CEA8-4860-9757-7A11AC3F23CB}" type="datetimeFigureOut">
               <a:rPr lang="en-US" smtClean="0"/>
-              <a:t>11/13/25</a:t>
+              <a:t>11/20/2025</a:t>
             </a:fld>
             <a:endParaRPr lang="en-US"/>
           </a:p>
@@ -431,7 +431,7 @@
           <a:p>
             <a:fld id="{052CEAA0-CEA8-4860-9757-7A11AC3F23CB}" type="datetimeFigureOut">
               <a:rPr lang="en-US" smtClean="0"/>
-              <a:t>11/13/25</a:t>
+              <a:t>11/20/2025</a:t>
             </a:fld>
             <a:endParaRPr lang="en-US"/>
           </a:p>
@@ -611,7 +611,7 @@
           <a:p>
             <a:fld id="{052CEAA0-CEA8-4860-9757-7A11AC3F23CB}" type="datetimeFigureOut">
               <a:rPr lang="en-US" smtClean="0"/>
-              <a:t>11/13/25</a:t>
+              <a:t>11/20/2025</a:t>
             </a:fld>
             <a:endParaRPr lang="en-US"/>
           </a:p>
@@ -781,7 +781,7 @@
           <a:p>
             <a:fld id="{052CEAA0-CEA8-4860-9757-7A11AC3F23CB}" type="datetimeFigureOut">
               <a:rPr lang="en-US" smtClean="0"/>
-              <a:t>11/13/25</a:t>
+              <a:t>11/20/2025</a:t>
             </a:fld>
             <a:endParaRPr lang="en-US"/>
           </a:p>
@@ -1027,7 +1027,7 @@
           <a:p>
             <a:fld id="{052CEAA0-CEA8-4860-9757-7A11AC3F23CB}" type="datetimeFigureOut">
               <a:rPr lang="en-US" smtClean="0"/>
-              <a:t>11/13/25</a:t>
+              <a:t>11/20/2025</a:t>
             </a:fld>
             <a:endParaRPr lang="en-US"/>
           </a:p>
@@ -1259,7 +1259,7 @@
           <a:p>
             <a:fld id="{052CEAA0-CEA8-4860-9757-7A11AC3F23CB}" type="datetimeFigureOut">
               <a:rPr lang="en-US" smtClean="0"/>
-              <a:t>11/13/25</a:t>
+              <a:t>11/20/2025</a:t>
             </a:fld>
             <a:endParaRPr lang="en-US"/>
           </a:p>
@@ -1626,7 +1626,7 @@
           <a:p>
             <a:fld id="{052CEAA0-CEA8-4860-9757-7A11AC3F23CB}" type="datetimeFigureOut">
               <a:rPr lang="en-US" smtClean="0"/>
-              <a:t>11/13/25</a:t>
+              <a:t>11/20/2025</a:t>
             </a:fld>
             <a:endParaRPr lang="en-US"/>
           </a:p>
@@ -1744,7 +1744,7 @@
           <a:p>
             <a:fld id="{052CEAA0-CEA8-4860-9757-7A11AC3F23CB}" type="datetimeFigureOut">
               <a:rPr lang="en-US" smtClean="0"/>
-              <a:t>11/13/25</a:t>
+              <a:t>11/20/2025</a:t>
             </a:fld>
             <a:endParaRPr lang="en-US"/>
           </a:p>
@@ -1839,7 +1839,7 @@
           <a:p>
             <a:fld id="{052CEAA0-CEA8-4860-9757-7A11AC3F23CB}" type="datetimeFigureOut">
               <a:rPr lang="en-US" smtClean="0"/>
-              <a:t>11/13/25</a:t>
+              <a:t>11/20/2025</a:t>
             </a:fld>
             <a:endParaRPr lang="en-US"/>
           </a:p>
@@ -2116,7 +2116,7 @@
           <a:p>
             <a:fld id="{052CEAA0-CEA8-4860-9757-7A11AC3F23CB}" type="datetimeFigureOut">
               <a:rPr lang="en-US" smtClean="0"/>
-              <a:t>11/13/25</a:t>
+              <a:t>11/20/2025</a:t>
             </a:fld>
             <a:endParaRPr lang="en-US"/>
           </a:p>
@@ -2373,7 +2373,7 @@
           <a:p>
             <a:fld id="{052CEAA0-CEA8-4860-9757-7A11AC3F23CB}" type="datetimeFigureOut">
               <a:rPr lang="en-US" smtClean="0"/>
-              <a:t>11/13/25</a:t>
+              <a:t>11/20/2025</a:t>
             </a:fld>
             <a:endParaRPr lang="en-US"/>
           </a:p>
@@ -2586,7 +2586,7 @@
           <a:p>
             <a:fld id="{052CEAA0-CEA8-4860-9757-7A11AC3F23CB}" type="datetimeFigureOut">
               <a:rPr lang="en-US" smtClean="0"/>
-              <a:t>11/13/25</a:t>
+              <a:t>11/20/2025</a:t>
             </a:fld>
             <a:endParaRPr lang="en-US"/>
           </a:p>
@@ -3014,7 +3014,7 @@
           <a:p>
             <a:r>
               <a:rPr lang="en-US" dirty="0"/>
-              <a:t>{ your game title here }</a:t>
+              <a:t>Bolter Slug</a:t>
             </a:r>
           </a:p>
         </p:txBody>
@@ -3038,7 +3038,7 @@
         <p:spPr/>
         <p:txBody>
           <a:bodyPr>
-            <a:normAutofit lnSpcReduction="10000"/>
+            <a:normAutofit fontScale="92500" lnSpcReduction="20000"/>
           </a:bodyPr>
           <a:lstStyle/>
           <a:p>
@@ -3050,36 +3050,20 @@
           <a:p>
             <a:r>
               <a:rPr lang="en-US" dirty="0"/>
-              <a:t>{ your name }</a:t>
+              <a:t>Jake Terry</a:t>
             </a:r>
             <a:br>
               <a:rPr lang="en-US" dirty="0"/>
             </a:br>
             <a:r>
               <a:rPr lang="en-US" dirty="0"/>
-              <a:t>{link to </a:t>
-            </a:r>
-            <a:r>
-              <a:rPr lang="en-US" dirty="0" err="1"/>
-              <a:t>github</a:t>
-            </a:r>
-            <a:r>
-              <a:rPr lang="en-US" dirty="0"/>
-              <a:t>}</a:t>
-            </a:r>
-          </a:p>
-          <a:p>
-            <a:r>
-              <a:rPr lang="en-US" dirty="0"/>
-              <a:t>{ link to </a:t>
-            </a:r>
-            <a:r>
-              <a:rPr lang="en-US" dirty="0" err="1"/>
-              <a:t>itch.io</a:t>
-            </a:r>
-            <a:r>
-              <a:rPr lang="en-US" dirty="0"/>
-              <a:t> }</a:t>
+              <a:t>https://github.com/jaketerry28/CS315-Game-Programming/tree/main/final-project</a:t>
+            </a:r>
+          </a:p>
+          <a:p>
+            <a:r>
+              <a:rPr lang="en-US" dirty="0"/>
+              <a:t>https://jaketerry28.itch.io/bolt-slug</a:t>
             </a:r>
           </a:p>
         </p:txBody>
@@ -4245,31 +4229,90 @@
           </a:p>
         </p:txBody>
       </p:sp>
-      <p:sp>
-        <p:nvSpPr>
-          <p:cNvPr id="3" name="Content Placeholder 2">
+      <p:pic>
+        <p:nvPicPr>
+          <p:cNvPr id="1026" name="Picture 2" descr="Metal Slug (serie) - Wikipedia">
             <a:extLst>
               <a:ext uri="{FF2B5EF4-FFF2-40B4-BE49-F238E27FC236}">
-                <a16:creationId xmlns:a16="http://schemas.microsoft.com/office/drawing/2014/main" id="{CEFC3362-BE8E-BB9B-F46A-0464325FD189}"/>
+                <a16:creationId xmlns:a16="http://schemas.microsoft.com/office/drawing/2014/main" id="{88951CF2-45BC-C88A-A747-B005E78BF52B}"/>
               </a:ext>
             </a:extLst>
           </p:cNvPr>
-          <p:cNvSpPr>
-            <a:spLocks noGrp="1"/>
-          </p:cNvSpPr>
+          <p:cNvPicPr>
+            <a:picLocks noGrp="1" noChangeAspect="1" noChangeArrowheads="1"/>
+          </p:cNvPicPr>
           <p:nvPr>
             <p:ph idx="1"/>
           </p:nvPr>
-        </p:nvSpPr>
-        <p:spPr/>
-        <p:txBody>
-          <a:bodyPr/>
-          <a:lstStyle/>
-          <a:p>
-            <a:r>
-              <a:rPr lang="en-US" dirty="0"/>
-              <a:t>Add a screenshot of your game here</a:t>
-            </a:r>
+        </p:nvPicPr>
+        <p:blipFill>
+          <a:blip r:embed="rId2">
+            <a:extLst>
+              <a:ext uri="{28A0092B-C50C-407E-A947-70E740481C1C}">
+                <a14:useLocalDpi xmlns:a14="http://schemas.microsoft.com/office/drawing/2010/main" val="0"/>
+              </a:ext>
+            </a:extLst>
+          </a:blip>
+          <a:srcRect/>
+          <a:stretch>
+            <a:fillRect/>
+          </a:stretch>
+        </p:blipFill>
+        <p:spPr bwMode="auto">
+          <a:xfrm>
+            <a:off x="3490452" y="2665383"/>
+            <a:ext cx="5023362" cy="3700416"/>
+          </a:xfrm>
+          <a:prstGeom prst="rect">
+            <a:avLst/>
+          </a:prstGeom>
+          <a:noFill/>
+          <a:extLst>
+            <a:ext uri="{909E8E84-426E-40DD-AFC4-6F175D3DCCD1}">
+              <a14:hiddenFill xmlns:a14="http://schemas.microsoft.com/office/drawing/2010/main">
+                <a:solidFill>
+                  <a:srgbClr val="FFFFFF"/>
+                </a:solidFill>
+              </a14:hiddenFill>
+            </a:ext>
+          </a:extLst>
+        </p:spPr>
+      </p:pic>
+      <p:sp>
+        <p:nvSpPr>
+          <p:cNvPr id="6" name="TextBox 5">
+            <a:extLst>
+              <a:ext uri="{FF2B5EF4-FFF2-40B4-BE49-F238E27FC236}">
+                <a16:creationId xmlns:a16="http://schemas.microsoft.com/office/drawing/2014/main" id="{313272FF-E405-8638-3981-3DE850FFB7FB}"/>
+              </a:ext>
+            </a:extLst>
+          </p:cNvPr>
+          <p:cNvSpPr txBox="1"/>
+          <p:nvPr/>
+        </p:nvSpPr>
+        <p:spPr>
+          <a:xfrm>
+            <a:off x="1238864" y="1956619"/>
+            <a:ext cx="5230761" cy="646331"/>
+          </a:xfrm>
+          <a:prstGeom prst="rect">
+            <a:avLst/>
+          </a:prstGeom>
+          <a:noFill/>
+        </p:spPr>
+        <p:txBody>
+          <a:bodyPr wrap="square" rtlCol="0">
+            <a:spAutoFit/>
+          </a:bodyPr>
+          <a:lstStyle/>
+          <a:p>
+            <a:r>
+              <a:rPr lang="en-US" dirty="0"/>
+              <a:t>Inspiration from Metal Slug</a:t>
+            </a:r>
+          </a:p>
+          <a:p>
+            <a:endParaRPr lang="en-US" dirty="0"/>
           </a:p>
         </p:txBody>
       </p:sp>
@@ -4765,13 +4808,40 @@
           <a:bodyPr/>
           <a:lstStyle/>
           <a:p>
-            <a:r>
-              <a:rPr lang="en-US" dirty="0"/>
-              <a:t>Add a screenshot of your game here</a:t>
-            </a:r>
-          </a:p>
-        </p:txBody>
-      </p:sp>
+            <a:endParaRPr lang="en-US" dirty="0"/>
+          </a:p>
+        </p:txBody>
+      </p:sp>
+      <p:pic>
+        <p:nvPicPr>
+          <p:cNvPr id="5" name="Picture 4">
+            <a:extLst>
+              <a:ext uri="{FF2B5EF4-FFF2-40B4-BE49-F238E27FC236}">
+                <a16:creationId xmlns:a16="http://schemas.microsoft.com/office/drawing/2014/main" id="{02A29225-F9B1-3F70-C6EE-5AE819552D8F}"/>
+              </a:ext>
+            </a:extLst>
+          </p:cNvPr>
+          <p:cNvPicPr>
+            <a:picLocks noChangeAspect="1"/>
+          </p:cNvPicPr>
+          <p:nvPr/>
+        </p:nvPicPr>
+        <p:blipFill>
+          <a:blip r:embed="rId2"/>
+          <a:stretch>
+            <a:fillRect/>
+          </a:stretch>
+        </p:blipFill>
+        <p:spPr>
+          <a:xfrm>
+            <a:off x="1601816" y="1592365"/>
+            <a:ext cx="8988368" cy="5051054"/>
+          </a:xfrm>
+          <a:prstGeom prst="rect">
+            <a:avLst/>
+          </a:prstGeom>
+        </p:spPr>
+      </p:pic>
     </p:spTree>
     <p:extLst>
       <p:ext uri="{BB962C8B-B14F-4D97-AF65-F5344CB8AC3E}">

</xml_diff>